<commit_message>
changed trigger screen and instructions
</commit_message>
<xml_diff>
--- a/clock-practise/clock_task_instruction.pptx
+++ b/clock-practise/clock_task_instruction.pptx
@@ -5,18 +5,19 @@
     <p:sldMasterId id="2147483648" r:id="rId1"/>
   </p:sldMasterIdLst>
   <p:notesMasterIdLst>
-    <p:notesMasterId r:id="rId8"/>
+    <p:notesMasterId r:id="rId9"/>
   </p:notesMasterIdLst>
   <p:handoutMasterIdLst>
-    <p:handoutMasterId r:id="rId9"/>
+    <p:handoutMasterId r:id="rId10"/>
   </p:handoutMasterIdLst>
   <p:sldIdLst>
-    <p:sldId id="462" r:id="rId2"/>
-    <p:sldId id="479" r:id="rId3"/>
-    <p:sldId id="631" r:id="rId4"/>
-    <p:sldId id="474" r:id="rId5"/>
-    <p:sldId id="618" r:id="rId6"/>
-    <p:sldId id="605" r:id="rId7"/>
+    <p:sldId id="633" r:id="rId2"/>
+    <p:sldId id="462" r:id="rId3"/>
+    <p:sldId id="479" r:id="rId4"/>
+    <p:sldId id="631" r:id="rId5"/>
+    <p:sldId id="474" r:id="rId6"/>
+    <p:sldId id="618" r:id="rId7"/>
+    <p:sldId id="605" r:id="rId8"/>
   </p:sldIdLst>
   <p:sldSz cx="12192000" cy="6858000"/>
   <p:notesSz cx="6858000" cy="9144000"/>
@@ -253,7 +254,7 @@
           <a:p>
             <a:fld id="{BD82A94B-8595-419C-BF57-D51AB33609D1}" type="datetimeFigureOut">
               <a:rPr lang="en-US" smtClean="0"/>
-              <a:t>2/26/2024</a:t>
+              <a:t>3/4/2024</a:t>
             </a:fld>
             <a:endParaRPr lang="en-US" dirty="0"/>
           </a:p>
@@ -430,7 +431,7 @@
           <a:p>
             <a:fld id="{652BB16F-2169-4A0F-818F-214041E36035}" type="datetimeFigureOut">
               <a:rPr lang="en-GB" smtClean="0"/>
-              <a:t>26/02/2024</a:t>
+              <a:t>04/03/2024</a:t>
             </a:fld>
             <a:endParaRPr lang="en-GB" dirty="0"/>
           </a:p>
@@ -767,7 +768,7 @@
           <a:p>
             <a:fld id="{EFB1C814-5629-4CB9-A579-94B764A1EBE2}" type="slidenum">
               <a:rPr lang="zh-HK" altLang="en-US" smtClean="0"/>
-              <a:t>1</a:t>
+              <a:t>2</a:t>
             </a:fld>
             <a:endParaRPr lang="zh-HK" altLang="en-US"/>
           </a:p>
@@ -855,7 +856,7 @@
           <a:p>
             <a:fld id="{EFB1C814-5629-4CB9-A579-94B764A1EBE2}" type="slidenum">
               <a:rPr lang="zh-HK" altLang="en-US" smtClean="0"/>
-              <a:t>2</a:t>
+              <a:t>3</a:t>
             </a:fld>
             <a:endParaRPr lang="zh-HK" altLang="en-US"/>
           </a:p>
@@ -943,7 +944,7 @@
           <a:p>
             <a:fld id="{EFB1C814-5629-4CB9-A579-94B764A1EBE2}" type="slidenum">
               <a:rPr lang="zh-HK" altLang="en-US" smtClean="0"/>
-              <a:t>3</a:t>
+              <a:t>4</a:t>
             </a:fld>
             <a:endParaRPr lang="zh-HK" altLang="en-US"/>
           </a:p>
@@ -1027,7 +1028,7 @@
           <a:p>
             <a:fld id="{85522B51-E2AB-4BF4-A91F-416D8CC31592}" type="slidenum">
               <a:rPr lang="en-GB" smtClean="0"/>
-              <a:t>4</a:t>
+              <a:t>5</a:t>
             </a:fld>
             <a:endParaRPr lang="en-GB" dirty="0"/>
           </a:p>
@@ -1185,7 +1186,7 @@
           <a:p>
             <a:fld id="{724A9933-0BD2-45EA-8819-99110733ED14}" type="datetimeFigureOut">
               <a:rPr lang="en-GB" smtClean="0"/>
-              <a:t>26/02/2024</a:t>
+              <a:t>04/03/2024</a:t>
             </a:fld>
             <a:endParaRPr lang="en-GB" dirty="0"/>
           </a:p>
@@ -1355,7 +1356,7 @@
           <a:p>
             <a:fld id="{724A9933-0BD2-45EA-8819-99110733ED14}" type="datetimeFigureOut">
               <a:rPr lang="en-GB" smtClean="0"/>
-              <a:t>26/02/2024</a:t>
+              <a:t>04/03/2024</a:t>
             </a:fld>
             <a:endParaRPr lang="en-GB" dirty="0"/>
           </a:p>
@@ -1535,7 +1536,7 @@
           <a:p>
             <a:fld id="{724A9933-0BD2-45EA-8819-99110733ED14}" type="datetimeFigureOut">
               <a:rPr lang="en-GB" smtClean="0"/>
-              <a:t>26/02/2024</a:t>
+              <a:t>04/03/2024</a:t>
             </a:fld>
             <a:endParaRPr lang="en-GB" dirty="0"/>
           </a:p>
@@ -1749,7 +1750,7 @@
           <a:p>
             <a:fld id="{724A9933-0BD2-45EA-8819-99110733ED14}" type="datetimeFigureOut">
               <a:rPr lang="en-GB" smtClean="0"/>
-              <a:t>26/02/2024</a:t>
+              <a:t>04/03/2024</a:t>
             </a:fld>
             <a:endParaRPr lang="en-GB" dirty="0"/>
           </a:p>
@@ -1995,7 +1996,7 @@
           <a:p>
             <a:fld id="{724A9933-0BD2-45EA-8819-99110733ED14}" type="datetimeFigureOut">
               <a:rPr lang="en-GB" smtClean="0"/>
-              <a:t>26/02/2024</a:t>
+              <a:t>04/03/2024</a:t>
             </a:fld>
             <a:endParaRPr lang="en-GB" dirty="0"/>
           </a:p>
@@ -2227,7 +2228,7 @@
           <a:p>
             <a:fld id="{724A9933-0BD2-45EA-8819-99110733ED14}" type="datetimeFigureOut">
               <a:rPr lang="en-GB" smtClean="0"/>
-              <a:t>26/02/2024</a:t>
+              <a:t>04/03/2024</a:t>
             </a:fld>
             <a:endParaRPr lang="en-GB" dirty="0"/>
           </a:p>
@@ -2594,7 +2595,7 @@
           <a:p>
             <a:fld id="{724A9933-0BD2-45EA-8819-99110733ED14}" type="datetimeFigureOut">
               <a:rPr lang="en-GB" smtClean="0"/>
-              <a:t>26/02/2024</a:t>
+              <a:t>04/03/2024</a:t>
             </a:fld>
             <a:endParaRPr lang="en-GB" dirty="0"/>
           </a:p>
@@ -2712,7 +2713,7 @@
           <a:p>
             <a:fld id="{724A9933-0BD2-45EA-8819-99110733ED14}" type="datetimeFigureOut">
               <a:rPr lang="en-GB" smtClean="0"/>
-              <a:t>26/02/2024</a:t>
+              <a:t>04/03/2024</a:t>
             </a:fld>
             <a:endParaRPr lang="en-GB" dirty="0"/>
           </a:p>
@@ -2807,7 +2808,7 @@
           <a:p>
             <a:fld id="{724A9933-0BD2-45EA-8819-99110733ED14}" type="datetimeFigureOut">
               <a:rPr lang="en-GB" smtClean="0"/>
-              <a:t>26/02/2024</a:t>
+              <a:t>04/03/2024</a:t>
             </a:fld>
             <a:endParaRPr lang="en-GB" dirty="0"/>
           </a:p>
@@ -3084,7 +3085,7 @@
           <a:p>
             <a:fld id="{724A9933-0BD2-45EA-8819-99110733ED14}" type="datetimeFigureOut">
               <a:rPr lang="en-GB" smtClean="0"/>
-              <a:t>26/02/2024</a:t>
+              <a:t>04/03/2024</a:t>
             </a:fld>
             <a:endParaRPr lang="en-GB" dirty="0"/>
           </a:p>
@@ -3337,7 +3338,7 @@
           <a:p>
             <a:fld id="{724A9933-0BD2-45EA-8819-99110733ED14}" type="datetimeFigureOut">
               <a:rPr lang="en-GB" smtClean="0"/>
-              <a:t>26/02/2024</a:t>
+              <a:t>04/03/2024</a:t>
             </a:fld>
             <a:endParaRPr lang="en-GB" dirty="0"/>
           </a:p>
@@ -3553,7 +3554,7 @@
           <a:p>
             <a:fld id="{724A9933-0BD2-45EA-8819-99110733ED14}" type="datetimeFigureOut">
               <a:rPr lang="en-GB" smtClean="0"/>
-              <a:t>26/02/2024</a:t>
+              <a:t>04/03/2024</a:t>
             </a:fld>
             <a:endParaRPr lang="en-GB" dirty="0"/>
           </a:p>
@@ -3960,6 +3961,75 @@
       </p:grpSpPr>
       <p:sp>
         <p:nvSpPr>
+          <p:cNvPr id="2" name="標題 1"/>
+          <p:cNvSpPr>
+            <a:spLocks noGrp="1"/>
+          </p:cNvSpPr>
+          <p:nvPr>
+            <p:ph type="title"/>
+          </p:nvPr>
+        </p:nvSpPr>
+        <p:spPr>
+          <a:xfrm>
+            <a:off x="4636499" y="2509837"/>
+            <a:ext cx="3145425" cy="1325563"/>
+          </a:xfrm>
+        </p:spPr>
+        <p:txBody>
+          <a:bodyPr>
+            <a:normAutofit fontScale="90000"/>
+          </a:bodyPr>
+          <a:lstStyle/>
+          <a:p>
+            <a:pPr algn="ctr"/>
+            <a:r>
+              <a:rPr lang="zh-CN" altLang="en-US" sz="6000" dirty="0">
+                <a:solidFill>
+                  <a:schemeClr val="bg1"/>
+                </a:solidFill>
+              </a:rPr>
+              <a:t>時鐘實驗</a:t>
+            </a:r>
+            <a:endParaRPr lang="en-GB" sz="3600" dirty="0">
+              <a:solidFill>
+                <a:schemeClr val="bg1"/>
+              </a:solidFill>
+            </a:endParaRPr>
+          </a:p>
+        </p:txBody>
+      </p:sp>
+    </p:spTree>
+    <p:extLst>
+      <p:ext uri="{BB962C8B-B14F-4D97-AF65-F5344CB8AC3E}">
+        <p14:creationId xmlns:p14="http://schemas.microsoft.com/office/powerpoint/2010/main" val="4015639817"/>
+      </p:ext>
+    </p:extLst>
+  </p:cSld>
+  <p:clrMapOvr>
+    <a:masterClrMapping/>
+  </p:clrMapOvr>
+</p:sld>
+</file>
+
+<file path=ppt/slides/slide2.xml><?xml version="1.0" encoding="utf-8"?>
+<p:sld xmlns:a="http://schemas.openxmlformats.org/drawingml/2006/main" xmlns:r="http://schemas.openxmlformats.org/officeDocument/2006/relationships" xmlns:p="http://schemas.openxmlformats.org/presentationml/2006/main">
+  <p:cSld>
+    <p:spTree>
+      <p:nvGrpSpPr>
+        <p:cNvPr id="1" name=""/>
+        <p:cNvGrpSpPr/>
+        <p:nvPr/>
+      </p:nvGrpSpPr>
+      <p:grpSpPr>
+        <a:xfrm>
+          <a:off x="0" y="0"/>
+          <a:ext cx="0" cy="0"/>
+          <a:chOff x="0" y="0"/>
+          <a:chExt cx="0" cy="0"/>
+        </a:xfrm>
+      </p:grpSpPr>
+      <p:sp>
+        <p:nvSpPr>
           <p:cNvPr id="3" name="TextBox 2">
             <a:extLst>
               <a:ext uri="{FF2B5EF4-FFF2-40B4-BE49-F238E27FC236}">
@@ -4140,7 +4210,7 @@
 </p:sld>
 </file>
 
-<file path=ppt/slides/slide2.xml><?xml version="1.0" encoding="utf-8"?>
+<file path=ppt/slides/slide3.xml><?xml version="1.0" encoding="utf-8"?>
 <p:sld xmlns:a="http://schemas.openxmlformats.org/drawingml/2006/main" xmlns:r="http://schemas.openxmlformats.org/officeDocument/2006/relationships" xmlns:p="http://schemas.openxmlformats.org/presentationml/2006/main">
   <p:cSld>
     <p:spTree>
@@ -4778,7 +4848,7 @@
 </p:sld>
 </file>
 
-<file path=ppt/slides/slide3.xml><?xml version="1.0" encoding="utf-8"?>
+<file path=ppt/slides/slide4.xml><?xml version="1.0" encoding="utf-8"?>
 <p:sld xmlns:a="http://schemas.openxmlformats.org/drawingml/2006/main" xmlns:r="http://schemas.openxmlformats.org/officeDocument/2006/relationships" xmlns:p="http://schemas.openxmlformats.org/presentationml/2006/main">
   <p:cSld>
     <p:spTree>
@@ -5065,77 +5135,6 @@
 </p:sld>
 </file>
 
-<file path=ppt/slides/slide4.xml><?xml version="1.0" encoding="utf-8"?>
-<p:sld xmlns:a="http://schemas.openxmlformats.org/drawingml/2006/main" xmlns:r="http://schemas.openxmlformats.org/officeDocument/2006/relationships" xmlns:p="http://schemas.openxmlformats.org/presentationml/2006/main">
-  <p:cSld>
-    <p:spTree>
-      <p:nvGrpSpPr>
-        <p:cNvPr id="1" name=""/>
-        <p:cNvGrpSpPr/>
-        <p:nvPr/>
-      </p:nvGrpSpPr>
-      <p:grpSpPr>
-        <a:xfrm>
-          <a:off x="0" y="0"/>
-          <a:ext cx="0" cy="0"/>
-          <a:chOff x="0" y="0"/>
-          <a:chExt cx="0" cy="0"/>
-        </a:xfrm>
-      </p:grpSpPr>
-      <p:sp>
-        <p:nvSpPr>
-          <p:cNvPr id="2" name="TextBox 1">
-            <a:extLst>
-              <a:ext uri="{FF2B5EF4-FFF2-40B4-BE49-F238E27FC236}">
-                <a16:creationId xmlns:a16="http://schemas.microsoft.com/office/drawing/2014/main" id="{EF431EDF-338B-459C-A0D1-CA610995C1F2}"/>
-              </a:ext>
-            </a:extLst>
-          </p:cNvPr>
-          <p:cNvSpPr txBox="1"/>
-          <p:nvPr/>
-        </p:nvSpPr>
-        <p:spPr>
-          <a:xfrm>
-            <a:off x="5574258" y="2497976"/>
-            <a:ext cx="1043483" cy="1862048"/>
-          </a:xfrm>
-          <a:prstGeom prst="rect">
-            <a:avLst/>
-          </a:prstGeom>
-          <a:noFill/>
-        </p:spPr>
-        <p:txBody>
-          <a:bodyPr wrap="square" rtlCol="0">
-            <a:spAutoFit/>
-          </a:bodyPr>
-          <a:lstStyle/>
-          <a:p>
-            <a:r>
-              <a:rPr lang="en-US" sz="11500" dirty="0">
-                <a:solidFill>
-                  <a:schemeClr val="bg1"/>
-                </a:solidFill>
-                <a:latin typeface="Arial" panose="020B0604020202020204" pitchFamily="34" charset="0"/>
-                <a:cs typeface="Arial" panose="020B0604020202020204" pitchFamily="34" charset="0"/>
-              </a:rPr>
-              <a:t>+</a:t>
-            </a:r>
-          </a:p>
-        </p:txBody>
-      </p:sp>
-    </p:spTree>
-    <p:extLst>
-      <p:ext uri="{BB962C8B-B14F-4D97-AF65-F5344CB8AC3E}">
-        <p14:creationId xmlns:p14="http://schemas.microsoft.com/office/powerpoint/2010/main" val="2264765009"/>
-      </p:ext>
-    </p:extLst>
-  </p:cSld>
-  <p:clrMapOvr>
-    <a:masterClrMapping/>
-  </p:clrMapOvr>
-</p:sld>
-</file>
-
 <file path=ppt/slides/slide5.xml><?xml version="1.0" encoding="utf-8"?>
 <p:sld xmlns:a="http://schemas.openxmlformats.org/drawingml/2006/main" xmlns:r="http://schemas.openxmlformats.org/officeDocument/2006/relationships" xmlns:p="http://schemas.openxmlformats.org/presentationml/2006/main">
   <p:cSld>
@@ -5155,6 +5154,77 @@
       </p:grpSpPr>
       <p:sp>
         <p:nvSpPr>
+          <p:cNvPr id="2" name="TextBox 1">
+            <a:extLst>
+              <a:ext uri="{FF2B5EF4-FFF2-40B4-BE49-F238E27FC236}">
+                <a16:creationId xmlns:a16="http://schemas.microsoft.com/office/drawing/2014/main" id="{EF431EDF-338B-459C-A0D1-CA610995C1F2}"/>
+              </a:ext>
+            </a:extLst>
+          </p:cNvPr>
+          <p:cNvSpPr txBox="1"/>
+          <p:nvPr/>
+        </p:nvSpPr>
+        <p:spPr>
+          <a:xfrm>
+            <a:off x="5574258" y="2497976"/>
+            <a:ext cx="1043483" cy="1862048"/>
+          </a:xfrm>
+          <a:prstGeom prst="rect">
+            <a:avLst/>
+          </a:prstGeom>
+          <a:noFill/>
+        </p:spPr>
+        <p:txBody>
+          <a:bodyPr wrap="square" rtlCol="0">
+            <a:spAutoFit/>
+          </a:bodyPr>
+          <a:lstStyle/>
+          <a:p>
+            <a:r>
+              <a:rPr lang="en-US" sz="11500" dirty="0">
+                <a:solidFill>
+                  <a:schemeClr val="bg1"/>
+                </a:solidFill>
+                <a:latin typeface="Arial" panose="020B0604020202020204" pitchFamily="34" charset="0"/>
+                <a:cs typeface="Arial" panose="020B0604020202020204" pitchFamily="34" charset="0"/>
+              </a:rPr>
+              <a:t>+</a:t>
+            </a:r>
+          </a:p>
+        </p:txBody>
+      </p:sp>
+    </p:spTree>
+    <p:extLst>
+      <p:ext uri="{BB962C8B-B14F-4D97-AF65-F5344CB8AC3E}">
+        <p14:creationId xmlns:p14="http://schemas.microsoft.com/office/powerpoint/2010/main" val="2264765009"/>
+      </p:ext>
+    </p:extLst>
+  </p:cSld>
+  <p:clrMapOvr>
+    <a:masterClrMapping/>
+  </p:clrMapOvr>
+</p:sld>
+</file>
+
+<file path=ppt/slides/slide6.xml><?xml version="1.0" encoding="utf-8"?>
+<p:sld xmlns:a="http://schemas.openxmlformats.org/drawingml/2006/main" xmlns:r="http://schemas.openxmlformats.org/officeDocument/2006/relationships" xmlns:p="http://schemas.openxmlformats.org/presentationml/2006/main">
+  <p:cSld>
+    <p:spTree>
+      <p:nvGrpSpPr>
+        <p:cNvPr id="1" name=""/>
+        <p:cNvGrpSpPr/>
+        <p:nvPr/>
+      </p:nvGrpSpPr>
+      <p:grpSpPr>
+        <a:xfrm>
+          <a:off x="0" y="0"/>
+          <a:ext cx="0" cy="0"/>
+          <a:chOff x="0" y="0"/>
+          <a:chExt cx="0" cy="0"/>
+        </a:xfrm>
+      </p:grpSpPr>
+      <p:sp>
+        <p:nvSpPr>
           <p:cNvPr id="2" name="標題 1"/>
           <p:cNvSpPr>
             <a:spLocks noGrp="1"/>
@@ -5205,7 +5275,7 @@
 </p:sld>
 </file>
 
-<file path=ppt/slides/slide6.xml><?xml version="1.0" encoding="utf-8"?>
+<file path=ppt/slides/slide7.xml><?xml version="1.0" encoding="utf-8"?>
 <p:sld xmlns:a="http://schemas.openxmlformats.org/drawingml/2006/main" xmlns:r="http://schemas.openxmlformats.org/officeDocument/2006/relationships" xmlns:p="http://schemas.openxmlformats.org/presentationml/2006/main">
   <p:cSld>
     <p:spTree>

</xml_diff>